<commit_message>
update colors of logo
</commit_message>
<xml_diff>
--- a/pr/crystal_logo_guide.pptx
+++ b/pr/crystal_logo_guide.pptx
@@ -221,7 +221,7 @@
           <a:p>
             <a:fld id="{54D8DF01-26A1-974C-9303-E9B9D2DF3455}" type="datetimeFigureOut">
               <a:rPr lang="en-US" smtClean="0"/>
-              <a:t>1/4/2024</a:t>
+              <a:t>2/13/2025</a:t>
             </a:fld>
             <a:endParaRPr lang="en-US"/>
           </a:p>
@@ -387,7 +387,7 @@
           <a:p>
             <a:fld id="{89E0CB65-4EED-4FC8-A16A-62A946525C04}" type="datetimeFigureOut">
               <a:rPr lang="en-HK" smtClean="0"/>
-              <a:t>4/1/2024</a:t>
+              <a:t>13/2/2025</a:t>
             </a:fld>
             <a:endParaRPr lang="en-HK"/>
           </a:p>
@@ -823,7 +823,7 @@
           <a:p>
             <a:fld id="{A45B4FE3-DD5B-4E02-916D-058860C0CD88}" type="datetime1">
               <a:rPr lang="en-US" smtClean="0"/>
-              <a:t>1/4/2024</a:t>
+              <a:t>2/13/2025</a:t>
             </a:fld>
             <a:endParaRPr lang="en-HK"/>
           </a:p>
@@ -1029,7 +1029,7 @@
           <a:p>
             <a:fld id="{76E28E0A-F8CE-4CEA-9D5D-82E774402653}" type="datetime1">
               <a:rPr lang="en-US" smtClean="0"/>
-              <a:t>1/4/2024</a:t>
+              <a:t>2/13/2025</a:t>
             </a:fld>
             <a:endParaRPr lang="en-HK"/>
           </a:p>
@@ -1245,7 +1245,7 @@
           <a:p>
             <a:fld id="{3ED77A4F-0E0A-48C4-93A8-DEAA8EE60EB7}" type="datetime1">
               <a:rPr lang="en-US" smtClean="0"/>
-              <a:t>1/4/2024</a:t>
+              <a:t>2/13/2025</a:t>
             </a:fld>
             <a:endParaRPr lang="en-HK"/>
           </a:p>
@@ -1451,7 +1451,7 @@
           <a:p>
             <a:fld id="{F5D3C17B-5D1E-4AD9-BABA-8FF223429122}" type="datetime1">
               <a:rPr lang="en-US" smtClean="0"/>
-              <a:t>1/4/2024</a:t>
+              <a:t>2/13/2025</a:t>
             </a:fld>
             <a:endParaRPr lang="en-HK"/>
           </a:p>
@@ -1733,7 +1733,7 @@
           <a:p>
             <a:fld id="{872F121C-F4A5-4B80-A880-8B34EB886805}" type="datetime1">
               <a:rPr lang="en-US" smtClean="0"/>
-              <a:t>1/4/2024</a:t>
+              <a:t>2/13/2025</a:t>
             </a:fld>
             <a:endParaRPr lang="en-HK"/>
           </a:p>
@@ -2001,7 +2001,7 @@
           <a:p>
             <a:fld id="{9DF80281-9BA3-4C81-906A-25349DFC79E9}" type="datetime1">
               <a:rPr lang="en-US" smtClean="0"/>
-              <a:t>1/4/2024</a:t>
+              <a:t>2/13/2025</a:t>
             </a:fld>
             <a:endParaRPr lang="en-HK"/>
           </a:p>
@@ -2404,7 +2404,7 @@
           <a:p>
             <a:fld id="{941118C8-2A97-4CDE-ACD8-41DB1E3027C6}" type="datetime1">
               <a:rPr lang="en-US" smtClean="0"/>
-              <a:t>1/4/2024</a:t>
+              <a:t>2/13/2025</a:t>
             </a:fld>
             <a:endParaRPr lang="en-HK"/>
           </a:p>
@@ -2558,7 +2558,7 @@
           <a:p>
             <a:fld id="{557CD008-42F0-4D3A-A93E-5721F92DDDA0}" type="datetime1">
               <a:rPr lang="en-US" smtClean="0"/>
-              <a:t>1/4/2024</a:t>
+              <a:t>2/13/2025</a:t>
             </a:fld>
             <a:endParaRPr lang="en-HK"/>
           </a:p>
@@ -2689,7 +2689,7 @@
           <a:p>
             <a:fld id="{1BAE17D1-A19A-4D8D-9A58-BD6DAAA66426}" type="datetime1">
               <a:rPr lang="en-US" smtClean="0"/>
-              <a:t>1/4/2024</a:t>
+              <a:t>2/13/2025</a:t>
             </a:fld>
             <a:endParaRPr lang="en-HK"/>
           </a:p>
@@ -3002,7 +3002,7 @@
           <a:p>
             <a:fld id="{0F24E5C2-9232-4287-B89D-8F407ED67BFE}" type="datetime1">
               <a:rPr lang="en-US" smtClean="0"/>
-              <a:t>1/4/2024</a:t>
+              <a:t>2/13/2025</a:t>
             </a:fld>
             <a:endParaRPr lang="en-HK"/>
           </a:p>
@@ -3295,7 +3295,7 @@
           <a:p>
             <a:fld id="{B165DAFE-120F-4672-BED1-8F27BD52FF2E}" type="datetime1">
               <a:rPr lang="en-US" smtClean="0"/>
-              <a:t>1/4/2024</a:t>
+              <a:t>2/13/2025</a:t>
             </a:fld>
             <a:endParaRPr lang="en-HK"/>
           </a:p>
@@ -3508,7 +3508,7 @@
           <a:p>
             <a:fld id="{6805F304-49AC-403F-8EBC-0202D5058BB9}" type="datetime1">
               <a:rPr lang="en-US" smtClean="0"/>
-              <a:t>1/4/2024</a:t>
+              <a:t>2/13/2025</a:t>
             </a:fld>
             <a:endParaRPr lang="en-HK"/>
           </a:p>
@@ -4694,7 +4694,15 @@
             </a:r>
             <a:r>
               <a:rPr lang="zh-CN" altLang="en-US" dirty="0"/>
-              <a:t> 组成的颜色</a:t>
+              <a:t> 组成</a:t>
+            </a:r>
+            <a:r>
+              <a:rPr lang="en-US" altLang="zh-CN" dirty="0"/>
+              <a:t>: </a:t>
+            </a:r>
+            <a:r>
+              <a:rPr lang="zh-CN" altLang="en-US" dirty="0"/>
+              <a:t>字体和颜色</a:t>
             </a:r>
           </a:p>
         </p:txBody>
@@ -4722,33 +4730,56 @@
           <a:p>
             <a:r>
               <a:rPr lang="en-US" altLang="zh-CN" dirty="0"/>
-              <a:t>#c41230 </a:t>
-            </a:r>
-          </a:p>
-          <a:p>
+              <a:t>#</a:t>
+            </a:r>
+            <a:r>
+              <a:rPr lang="en-US" altLang="zh-CN" b="0" i="0" dirty="0">
+                <a:solidFill>
+                  <a:srgbClr val="212529"/>
+                </a:solidFill>
+                <a:effectLst/>
+                <a:latin typeface="-apple-system"/>
+              </a:rPr>
+              <a:t>ae535c / pantone187U</a:t>
+            </a:r>
             <a:r>
               <a:rPr lang="en-US" altLang="zh-CN" dirty="0"/>
-              <a:t>#f68f1e</a:t>
+              <a:t> </a:t>
             </a:r>
           </a:p>
           <a:p>
             <a:r>
               <a:rPr lang="en-US" altLang="zh-CN" dirty="0"/>
-              <a:t>#c30f2d</a:t>
-            </a:r>
-          </a:p>
-          <a:p>
+              <a:t>#</a:t>
+            </a:r>
+            <a:r>
+              <a:rPr lang="en-US" altLang="zh-CN" b="0" i="0" dirty="0">
+                <a:solidFill>
+                  <a:srgbClr val="212529"/>
+                </a:solidFill>
+                <a:effectLst/>
+                <a:latin typeface="-apple-system"/>
+              </a:rPr>
+              <a:t>ff6c2f</a:t>
+            </a:r>
             <a:r>
               <a:rPr lang="en-US" altLang="zh-CN" dirty="0"/>
-              <a:t>#c51835</a:t>
+              <a:t> / pantone021U</a:t>
             </a:r>
           </a:p>
           <a:p>
             <a:r>
               <a:rPr lang="en-US" altLang="zh-CN" dirty="0"/>
-              <a:t>#f79226</a:t>
-            </a:r>
-            <a:endParaRPr lang="zh-CN" altLang="en-US" dirty="0"/>
+              <a:t>Font:</a:t>
+            </a:r>
+            <a:r>
+              <a:rPr lang="zh-CN" altLang="en-US" dirty="0"/>
+              <a:t> </a:t>
+            </a:r>
+            <a:r>
+              <a:rPr lang="en-US" altLang="zh-CN" dirty="0"/>
+              <a:t>Matura MT Script Capitals</a:t>
+            </a:r>
           </a:p>
         </p:txBody>
       </p:sp>
@@ -4795,7 +4826,7 @@
         </p:nvSpPr>
         <p:spPr>
           <a:xfrm>
-            <a:off x="2489703" y="1919335"/>
+            <a:off x="4881211" y="1906410"/>
             <a:ext cx="1004935" cy="271604"/>
           </a:xfrm>
           <a:prstGeom prst="roundRect">
@@ -4829,7 +4860,11 @@
           <a:lstStyle/>
           <a:p>
             <a:pPr algn="ctr"/>
-            <a:endParaRPr lang="zh-CN" altLang="en-US"/>
+            <a:endParaRPr lang="zh-CN" altLang="en-US">
+              <a:solidFill>
+                <a:srgbClr val="AE535C"/>
+              </a:solidFill>
+            </a:endParaRPr>
           </a:p>
         </p:txBody>
       </p:sp>
@@ -4847,7 +4882,7 @@
         </p:nvSpPr>
         <p:spPr>
           <a:xfrm>
-            <a:off x="2489702" y="2437049"/>
+            <a:off x="4881211" y="2412232"/>
             <a:ext cx="1004935" cy="271604"/>
           </a:xfrm>
           <a:prstGeom prst="roundRect">
@@ -4881,163 +4916,11 @@
           <a:lstStyle/>
           <a:p>
             <a:pPr algn="ctr"/>
-            <a:endParaRPr lang="zh-CN" altLang="en-US"/>
-          </a:p>
-        </p:txBody>
-      </p:sp>
-      <p:sp>
-        <p:nvSpPr>
-          <p:cNvPr id="7" name="矩形: 圆角 6">
-            <a:extLst>
-              <a:ext uri="{FF2B5EF4-FFF2-40B4-BE49-F238E27FC236}">
-                <a16:creationId xmlns:a16="http://schemas.microsoft.com/office/drawing/2014/main" id="{6A09F79D-6993-3379-3D9C-333D62F34C69}"/>
-              </a:ext>
-            </a:extLst>
-          </p:cNvPr>
-          <p:cNvSpPr/>
-          <p:nvPr/>
-        </p:nvSpPr>
-        <p:spPr>
-          <a:xfrm>
-            <a:off x="2489702" y="2943283"/>
-            <a:ext cx="1004935" cy="271604"/>
-          </a:xfrm>
-          <a:prstGeom prst="roundRect">
-            <a:avLst/>
-          </a:prstGeom>
-          <a:solidFill>
-            <a:srgbClr val="C30F2D"/>
-          </a:solidFill>
-          <a:ln>
-            <a:noFill/>
-          </a:ln>
-        </p:spPr>
-        <p:style>
-          <a:lnRef idx="2">
-            <a:schemeClr val="accent1">
-              <a:shade val="50000"/>
-            </a:schemeClr>
-          </a:lnRef>
-          <a:fillRef idx="1">
-            <a:schemeClr val="accent1"/>
-          </a:fillRef>
-          <a:effectRef idx="0">
-            <a:schemeClr val="accent1"/>
-          </a:effectRef>
-          <a:fontRef idx="minor">
-            <a:schemeClr val="lt1"/>
-          </a:fontRef>
-        </p:style>
-        <p:txBody>
-          <a:bodyPr rtlCol="0" anchor="ctr"/>
-          <a:lstStyle/>
-          <a:p>
-            <a:pPr algn="ctr"/>
-            <a:endParaRPr lang="zh-CN" altLang="en-US"/>
-          </a:p>
-        </p:txBody>
-      </p:sp>
-      <p:sp>
-        <p:nvSpPr>
-          <p:cNvPr id="8" name="矩形: 圆角 7">
-            <a:extLst>
-              <a:ext uri="{FF2B5EF4-FFF2-40B4-BE49-F238E27FC236}">
-                <a16:creationId xmlns:a16="http://schemas.microsoft.com/office/drawing/2014/main" id="{3368CAF3-71DF-FBEA-1C72-886C4EDE6913}"/>
-              </a:ext>
-            </a:extLst>
-          </p:cNvPr>
-          <p:cNvSpPr/>
-          <p:nvPr/>
-        </p:nvSpPr>
-        <p:spPr>
-          <a:xfrm>
-            <a:off x="2489702" y="3435627"/>
-            <a:ext cx="1004935" cy="271604"/>
-          </a:xfrm>
-          <a:prstGeom prst="roundRect">
-            <a:avLst/>
-          </a:prstGeom>
-          <a:solidFill>
-            <a:srgbClr val="C51835"/>
-          </a:solidFill>
-          <a:ln>
-            <a:noFill/>
-          </a:ln>
-        </p:spPr>
-        <p:style>
-          <a:lnRef idx="2">
-            <a:schemeClr val="accent1">
-              <a:shade val="50000"/>
-            </a:schemeClr>
-          </a:lnRef>
-          <a:fillRef idx="1">
-            <a:schemeClr val="accent1"/>
-          </a:fillRef>
-          <a:effectRef idx="0">
-            <a:schemeClr val="accent1"/>
-          </a:effectRef>
-          <a:fontRef idx="minor">
-            <a:schemeClr val="lt1"/>
-          </a:fontRef>
-        </p:style>
-        <p:txBody>
-          <a:bodyPr rtlCol="0" anchor="ctr"/>
-          <a:lstStyle/>
-          <a:p>
-            <a:pPr algn="ctr"/>
-            <a:endParaRPr lang="zh-CN" altLang="en-US"/>
-          </a:p>
-        </p:txBody>
-      </p:sp>
-      <p:sp>
-        <p:nvSpPr>
-          <p:cNvPr id="9" name="矩形: 圆角 8">
-            <a:extLst>
-              <a:ext uri="{FF2B5EF4-FFF2-40B4-BE49-F238E27FC236}">
-                <a16:creationId xmlns:a16="http://schemas.microsoft.com/office/drawing/2014/main" id="{A76FA3E2-9271-AFDA-E87D-669EB1CDE995}"/>
-              </a:ext>
-            </a:extLst>
-          </p:cNvPr>
-          <p:cNvSpPr/>
-          <p:nvPr/>
-        </p:nvSpPr>
-        <p:spPr>
-          <a:xfrm>
-            <a:off x="2489701" y="4001294"/>
-            <a:ext cx="1004935" cy="271604"/>
-          </a:xfrm>
-          <a:prstGeom prst="roundRect">
-            <a:avLst/>
-          </a:prstGeom>
-          <a:solidFill>
-            <a:srgbClr val="F79226"/>
-          </a:solidFill>
-          <a:ln>
-            <a:noFill/>
-          </a:ln>
-        </p:spPr>
-        <p:style>
-          <a:lnRef idx="2">
-            <a:schemeClr val="accent1">
-              <a:shade val="50000"/>
-            </a:schemeClr>
-          </a:lnRef>
-          <a:fillRef idx="1">
-            <a:schemeClr val="accent1"/>
-          </a:fillRef>
-          <a:effectRef idx="0">
-            <a:schemeClr val="accent1"/>
-          </a:effectRef>
-          <a:fontRef idx="minor">
-            <a:schemeClr val="lt1"/>
-          </a:fontRef>
-        </p:style>
-        <p:txBody>
-          <a:bodyPr rtlCol="0" anchor="ctr"/>
-          <a:lstStyle/>
-          <a:p>
-            <a:pPr algn="ctr"/>
-            <a:endParaRPr lang="zh-CN" altLang="en-US"/>
+            <a:endParaRPr lang="zh-CN" altLang="en-US">
+              <a:solidFill>
+                <a:srgbClr val="FF6C2F"/>
+              </a:solidFill>
+            </a:endParaRPr>
           </a:p>
         </p:txBody>
       </p:sp>

</xml_diff>